<commit_message>
cleanup and transfer times
</commit_message>
<xml_diff>
--- a/workflow.pptx
+++ b/workflow.pptx
@@ -244,7 +244,7 @@
           <a:p>
             <a:fld id="{FD0D3866-2CC8-4365-BD7D-99B708BF7AFC}" type="datetimeFigureOut">
               <a:rPr lang="en-NZ" smtClean="0"/>
-              <a:t>5/09/2016</a:t>
+              <a:t>27/09/2016</a:t>
             </a:fld>
             <a:endParaRPr lang="en-NZ"/>
           </a:p>
@@ -414,7 +414,7 @@
           <a:p>
             <a:fld id="{FD0D3866-2CC8-4365-BD7D-99B708BF7AFC}" type="datetimeFigureOut">
               <a:rPr lang="en-NZ" smtClean="0"/>
-              <a:t>5/09/2016</a:t>
+              <a:t>27/09/2016</a:t>
             </a:fld>
             <a:endParaRPr lang="en-NZ"/>
           </a:p>
@@ -594,7 +594,7 @@
           <a:p>
             <a:fld id="{FD0D3866-2CC8-4365-BD7D-99B708BF7AFC}" type="datetimeFigureOut">
               <a:rPr lang="en-NZ" smtClean="0"/>
-              <a:t>5/09/2016</a:t>
+              <a:t>27/09/2016</a:t>
             </a:fld>
             <a:endParaRPr lang="en-NZ"/>
           </a:p>
@@ -764,7 +764,7 @@
           <a:p>
             <a:fld id="{FD0D3866-2CC8-4365-BD7D-99B708BF7AFC}" type="datetimeFigureOut">
               <a:rPr lang="en-NZ" smtClean="0"/>
-              <a:t>5/09/2016</a:t>
+              <a:t>27/09/2016</a:t>
             </a:fld>
             <a:endParaRPr lang="en-NZ"/>
           </a:p>
@@ -1010,7 +1010,7 @@
           <a:p>
             <a:fld id="{FD0D3866-2CC8-4365-BD7D-99B708BF7AFC}" type="datetimeFigureOut">
               <a:rPr lang="en-NZ" smtClean="0"/>
-              <a:t>5/09/2016</a:t>
+              <a:t>27/09/2016</a:t>
             </a:fld>
             <a:endParaRPr lang="en-NZ"/>
           </a:p>
@@ -1242,7 +1242,7 @@
           <a:p>
             <a:fld id="{FD0D3866-2CC8-4365-BD7D-99B708BF7AFC}" type="datetimeFigureOut">
               <a:rPr lang="en-NZ" smtClean="0"/>
-              <a:t>5/09/2016</a:t>
+              <a:t>27/09/2016</a:t>
             </a:fld>
             <a:endParaRPr lang="en-NZ"/>
           </a:p>
@@ -1609,7 +1609,7 @@
           <a:p>
             <a:fld id="{FD0D3866-2CC8-4365-BD7D-99B708BF7AFC}" type="datetimeFigureOut">
               <a:rPr lang="en-NZ" smtClean="0"/>
-              <a:t>5/09/2016</a:t>
+              <a:t>27/09/2016</a:t>
             </a:fld>
             <a:endParaRPr lang="en-NZ"/>
           </a:p>
@@ -1727,7 +1727,7 @@
           <a:p>
             <a:fld id="{FD0D3866-2CC8-4365-BD7D-99B708BF7AFC}" type="datetimeFigureOut">
               <a:rPr lang="en-NZ" smtClean="0"/>
-              <a:t>5/09/2016</a:t>
+              <a:t>27/09/2016</a:t>
             </a:fld>
             <a:endParaRPr lang="en-NZ"/>
           </a:p>
@@ -1822,7 +1822,7 @@
           <a:p>
             <a:fld id="{FD0D3866-2CC8-4365-BD7D-99B708BF7AFC}" type="datetimeFigureOut">
               <a:rPr lang="en-NZ" smtClean="0"/>
-              <a:t>5/09/2016</a:t>
+              <a:t>27/09/2016</a:t>
             </a:fld>
             <a:endParaRPr lang="en-NZ"/>
           </a:p>
@@ -2099,7 +2099,7 @@
           <a:p>
             <a:fld id="{FD0D3866-2CC8-4365-BD7D-99B708BF7AFC}" type="datetimeFigureOut">
               <a:rPr lang="en-NZ" smtClean="0"/>
-              <a:t>5/09/2016</a:t>
+              <a:t>27/09/2016</a:t>
             </a:fld>
             <a:endParaRPr lang="en-NZ"/>
           </a:p>
@@ -2352,7 +2352,7 @@
           <a:p>
             <a:fld id="{FD0D3866-2CC8-4365-BD7D-99B708BF7AFC}" type="datetimeFigureOut">
               <a:rPr lang="en-NZ" smtClean="0"/>
-              <a:t>5/09/2016</a:t>
+              <a:t>27/09/2016</a:t>
             </a:fld>
             <a:endParaRPr lang="en-NZ"/>
           </a:p>
@@ -2565,7 +2565,7 @@
           <a:p>
             <a:fld id="{FD0D3866-2CC8-4365-BD7D-99B708BF7AFC}" type="datetimeFigureOut">
               <a:rPr lang="en-NZ" smtClean="0"/>
-              <a:t>5/09/2016</a:t>
+              <a:t>27/09/2016</a:t>
             </a:fld>
             <a:endParaRPr lang="en-NZ"/>
           </a:p>
@@ -10399,6 +10399,13 @@
   <p:clrMapOvr>
     <a:masterClrMapping/>
   </p:clrMapOvr>
+  <p:timing>
+    <p:tnLst>
+      <p:par>
+        <p:cTn id="1" dur="indefinite" restart="never" nodeType="tmRoot"/>
+      </p:par>
+    </p:tnLst>
+  </p:timing>
 </p:sld>
 </file>
 
@@ -15114,6 +15121,13 @@
   <p:clrMapOvr>
     <a:masterClrMapping/>
   </p:clrMapOvr>
+  <p:timing>
+    <p:tnLst>
+      <p:par>
+        <p:cTn id="1" dur="indefinite" restart="never" nodeType="tmRoot"/>
+      </p:par>
+    </p:tnLst>
+  </p:timing>
 </p:sld>
 </file>
 

</xml_diff>